<commit_message>
change pptx to adversarial perturbation
</commit_message>
<xml_diff>
--- a/system model pptx/constraint adversarial system graph.pptx
+++ b/system model pptx/constraint adversarial system graph.pptx
@@ -243,7 +243,7 @@
           <a:p>
             <a:fld id="{D9F0EDF4-13FD-B446-B4F6-2EB4AE8AC13A}" type="datetimeFigureOut">
               <a:rPr lang="en-TW" smtClean="0"/>
-              <a:t>2022/6/23</a:t>
+              <a:t>2022/7/10</a:t>
             </a:fld>
             <a:endParaRPr lang="en-TW"/>
           </a:p>
@@ -413,7 +413,7 @@
           <a:p>
             <a:fld id="{D9F0EDF4-13FD-B446-B4F6-2EB4AE8AC13A}" type="datetimeFigureOut">
               <a:rPr lang="en-TW" smtClean="0"/>
-              <a:t>2022/6/23</a:t>
+              <a:t>2022/7/10</a:t>
             </a:fld>
             <a:endParaRPr lang="en-TW"/>
           </a:p>
@@ -593,7 +593,7 @@
           <a:p>
             <a:fld id="{D9F0EDF4-13FD-B446-B4F6-2EB4AE8AC13A}" type="datetimeFigureOut">
               <a:rPr lang="en-TW" smtClean="0"/>
-              <a:t>2022/6/23</a:t>
+              <a:t>2022/7/10</a:t>
             </a:fld>
             <a:endParaRPr lang="en-TW"/>
           </a:p>
@@ -763,7 +763,7 @@
           <a:p>
             <a:fld id="{D9F0EDF4-13FD-B446-B4F6-2EB4AE8AC13A}" type="datetimeFigureOut">
               <a:rPr lang="en-TW" smtClean="0"/>
-              <a:t>2022/6/23</a:t>
+              <a:t>2022/7/10</a:t>
             </a:fld>
             <a:endParaRPr lang="en-TW"/>
           </a:p>
@@ -1009,7 +1009,7 @@
           <a:p>
             <a:fld id="{D9F0EDF4-13FD-B446-B4F6-2EB4AE8AC13A}" type="datetimeFigureOut">
               <a:rPr lang="en-TW" smtClean="0"/>
-              <a:t>2022/6/23</a:t>
+              <a:t>2022/7/10</a:t>
             </a:fld>
             <a:endParaRPr lang="en-TW"/>
           </a:p>
@@ -1241,7 +1241,7 @@
           <a:p>
             <a:fld id="{D9F0EDF4-13FD-B446-B4F6-2EB4AE8AC13A}" type="datetimeFigureOut">
               <a:rPr lang="en-TW" smtClean="0"/>
-              <a:t>2022/6/23</a:t>
+              <a:t>2022/7/10</a:t>
             </a:fld>
             <a:endParaRPr lang="en-TW"/>
           </a:p>
@@ -1608,7 +1608,7 @@
           <a:p>
             <a:fld id="{D9F0EDF4-13FD-B446-B4F6-2EB4AE8AC13A}" type="datetimeFigureOut">
               <a:rPr lang="en-TW" smtClean="0"/>
-              <a:t>2022/6/23</a:t>
+              <a:t>2022/7/10</a:t>
             </a:fld>
             <a:endParaRPr lang="en-TW"/>
           </a:p>
@@ -1726,7 +1726,7 @@
           <a:p>
             <a:fld id="{D9F0EDF4-13FD-B446-B4F6-2EB4AE8AC13A}" type="datetimeFigureOut">
               <a:rPr lang="en-TW" smtClean="0"/>
-              <a:t>2022/6/23</a:t>
+              <a:t>2022/7/10</a:t>
             </a:fld>
             <a:endParaRPr lang="en-TW"/>
           </a:p>
@@ -1821,7 +1821,7 @@
           <a:p>
             <a:fld id="{D9F0EDF4-13FD-B446-B4F6-2EB4AE8AC13A}" type="datetimeFigureOut">
               <a:rPr lang="en-TW" smtClean="0"/>
-              <a:t>2022/6/23</a:t>
+              <a:t>2022/7/10</a:t>
             </a:fld>
             <a:endParaRPr lang="en-TW"/>
           </a:p>
@@ -2098,7 +2098,7 @@
           <a:p>
             <a:fld id="{D9F0EDF4-13FD-B446-B4F6-2EB4AE8AC13A}" type="datetimeFigureOut">
               <a:rPr lang="en-TW" smtClean="0"/>
-              <a:t>2022/6/23</a:t>
+              <a:t>2022/7/10</a:t>
             </a:fld>
             <a:endParaRPr lang="en-TW"/>
           </a:p>
@@ -2355,7 +2355,7 @@
           <a:p>
             <a:fld id="{D9F0EDF4-13FD-B446-B4F6-2EB4AE8AC13A}" type="datetimeFigureOut">
               <a:rPr lang="en-TW" smtClean="0"/>
-              <a:t>2022/6/23</a:t>
+              <a:t>2022/7/10</a:t>
             </a:fld>
             <a:endParaRPr lang="en-TW"/>
           </a:p>
@@ -2568,7 +2568,7 @@
           <a:p>
             <a:fld id="{D9F0EDF4-13FD-B446-B4F6-2EB4AE8AC13A}" type="datetimeFigureOut">
               <a:rPr lang="en-TW" smtClean="0"/>
-              <a:t>2022/6/23</a:t>
+              <a:t>2022/7/10</a:t>
             </a:fld>
             <a:endParaRPr lang="en-TW"/>
           </a:p>
@@ -4106,8 +4106,8 @@
         </p:nvSpPr>
         <p:spPr>
           <a:xfrm>
-            <a:off x="346634" y="1601678"/>
-            <a:ext cx="1259127" cy="707886"/>
+            <a:off x="139599" y="1592808"/>
+            <a:ext cx="1543949" cy="707886"/>
           </a:xfrm>
           <a:prstGeom prst="rect">
             <a:avLst/>
@@ -4123,14 +4123,14 @@
             <a:pPr algn="ctr"/>
             <a:r>
               <a:rPr lang="en-TW" sz="2000" b="1" dirty="0"/>
-              <a:t>Adversary</a:t>
+              <a:t>Adversarial</a:t>
             </a:r>
           </a:p>
           <a:p>
             <a:pPr algn="ctr"/>
             <a:r>
               <a:rPr lang="en-TW" sz="2000" b="1" dirty="0"/>
-              <a:t>Perturb</a:t>
+              <a:t>Perturbation</a:t>
             </a:r>
           </a:p>
         </p:txBody>

</xml_diff>